<commit_message>
Class 03 - updated
</commit_message>
<xml_diff>
--- a/Classes/Week 03 - OOP & Rhino.Common/Class 03 - Objects and Rhino Common.pptx
+++ b/Classes/Week 03 - OOP & Rhino.Common/Class 03 - Objects and Rhino Common.pptx
@@ -26,6 +26,7 @@
     <p:sldId id="335" r:id="rId20"/>
     <p:sldId id="338" r:id="rId21"/>
     <p:sldId id="344" r:id="rId22"/>
+    <p:sldId id="345" r:id="rId23"/>
   </p:sldIdLst>
   <p:sldSz cx="12192000" cy="6858000"/>
   <p:notesSz cx="6858000" cy="9144000"/>
@@ -12567,6 +12568,116 @@
 </p:sld>
 </file>
 
+<file path=ppt/slides/slide22.xml><?xml version="1.0" encoding="utf-8"?>
+<p:sld xmlns:a="http://schemas.openxmlformats.org/drawingml/2006/main" xmlns:r="http://schemas.openxmlformats.org/officeDocument/2006/relationships" xmlns:p="http://schemas.openxmlformats.org/presentationml/2006/main">
+  <p:cSld>
+    <p:spTree>
+      <p:nvGrpSpPr>
+        <p:cNvPr id="1" name=""/>
+        <p:cNvGrpSpPr/>
+        <p:nvPr/>
+      </p:nvGrpSpPr>
+      <p:grpSpPr>
+        <a:xfrm>
+          <a:off x="0" y="0"/>
+          <a:ext cx="0" cy="0"/>
+          <a:chOff x="0" y="0"/>
+          <a:chExt cx="0" cy="0"/>
+        </a:xfrm>
+      </p:grpSpPr>
+      <p:sp>
+        <p:nvSpPr>
+          <p:cNvPr id="2" name="Title 1">
+            <a:extLst>
+              <a:ext uri="{FF2B5EF4-FFF2-40B4-BE49-F238E27FC236}">
+                <a16:creationId xmlns:a16="http://schemas.microsoft.com/office/drawing/2014/main" id="{5121BA0A-41E3-2905-FBFD-5C16EA3860F7}"/>
+              </a:ext>
+            </a:extLst>
+          </p:cNvPr>
+          <p:cNvSpPr>
+            <a:spLocks noGrp="1"/>
+          </p:cNvSpPr>
+          <p:nvPr>
+            <p:ph type="title"/>
+          </p:nvPr>
+        </p:nvSpPr>
+        <p:spPr/>
+        <p:txBody>
+          <a:bodyPr/>
+          <a:lstStyle/>
+          <a:p>
+            <a:endParaRPr lang="en-US"/>
+          </a:p>
+        </p:txBody>
+      </p:sp>
+      <p:sp>
+        <p:nvSpPr>
+          <p:cNvPr id="3" name="Content Placeholder 2">
+            <a:extLst>
+              <a:ext uri="{FF2B5EF4-FFF2-40B4-BE49-F238E27FC236}">
+                <a16:creationId xmlns:a16="http://schemas.microsoft.com/office/drawing/2014/main" id="{33AF27D5-8207-6E63-3D7B-803DE40C4BDE}"/>
+              </a:ext>
+            </a:extLst>
+          </p:cNvPr>
+          <p:cNvSpPr>
+            <a:spLocks noGrp="1"/>
+          </p:cNvSpPr>
+          <p:nvPr>
+            <p:ph idx="1"/>
+          </p:nvPr>
+        </p:nvSpPr>
+        <p:spPr/>
+        <p:txBody>
+          <a:bodyPr/>
+          <a:lstStyle/>
+          <a:p>
+            <a:endParaRPr lang="en-US"/>
+          </a:p>
+        </p:txBody>
+      </p:sp>
+      <p:pic>
+        <p:nvPicPr>
+          <p:cNvPr id="7" name="Picture 6">
+            <a:extLst>
+              <a:ext uri="{FF2B5EF4-FFF2-40B4-BE49-F238E27FC236}">
+                <a16:creationId xmlns:a16="http://schemas.microsoft.com/office/drawing/2014/main" id="{DEED046E-3DC4-DCCC-DFAB-9245CC36B590}"/>
+              </a:ext>
+            </a:extLst>
+          </p:cNvPr>
+          <p:cNvPicPr>
+            <a:picLocks noChangeAspect="1"/>
+          </p:cNvPicPr>
+          <p:nvPr/>
+        </p:nvPicPr>
+        <p:blipFill>
+          <a:blip r:embed="rId2"/>
+          <a:stretch>
+            <a:fillRect/>
+          </a:stretch>
+        </p:blipFill>
+        <p:spPr>
+          <a:xfrm>
+            <a:off x="0" y="963111"/>
+            <a:ext cx="12192000" cy="4931777"/>
+          </a:xfrm>
+          <a:prstGeom prst="rect">
+            <a:avLst/>
+          </a:prstGeom>
+        </p:spPr>
+      </p:pic>
+    </p:spTree>
+    <p:extLst>
+      <p:ext uri="{BB962C8B-B14F-4D97-AF65-F5344CB8AC3E}">
+        <p14:creationId xmlns:p14="http://schemas.microsoft.com/office/powerpoint/2010/main" val="1929240572"/>
+      </p:ext>
+    </p:extLst>
+  </p:cSld>
+  <p:clrMapOvr>
+    <a:masterClrMapping/>
+  </p:clrMapOvr>
+</p:sld>
+</file>
+
 <file path=ppt/slides/slide3.xml><?xml version="1.0" encoding="utf-8"?>
 <p:sld xmlns:a="http://schemas.openxmlformats.org/drawingml/2006/main" xmlns:r="http://schemas.openxmlformats.org/officeDocument/2006/relationships" xmlns:p="http://schemas.openxmlformats.org/presentationml/2006/main">
   <p:cSld>
@@ -12782,8 +12893,8 @@
         </p:nvSpPr>
         <p:spPr>
           <a:xfrm>
-            <a:off x="593606" y="870023"/>
-            <a:ext cx="4765794" cy="2752124"/>
+            <a:off x="593606" y="870022"/>
+            <a:ext cx="8361208" cy="5698828"/>
           </a:xfrm>
           <a:prstGeom prst="rect">
             <a:avLst/>
@@ -12804,7 +12915,7 @@
               </a:spcBef>
             </a:pPr>
             <a:r>
-              <a:rPr lang="en-US" sz="1519" dirty="0">
+              <a:rPr lang="en-US" sz="2800" dirty="0">
                 <a:latin typeface="Calibri"/>
                 <a:cs typeface="Calibri"/>
               </a:rPr>
@@ -12821,7 +12932,7 @@
               </a:spcBef>
             </a:pPr>
             <a:r>
-              <a:rPr lang="en-US" sz="1181" dirty="0">
+              <a:rPr lang="en-US" sz="2000" dirty="0">
                 <a:solidFill>
                   <a:srgbClr val="006FC0"/>
                 </a:solidFill>
@@ -12831,7 +12942,7 @@
               <a:t>There are </a:t>
             </a:r>
             <a:r>
-              <a:rPr lang="en-US" sz="1181" b="1" u="sng" dirty="0">
+              <a:rPr lang="en-US" sz="2000" b="1" u="sng" dirty="0">
                 <a:solidFill>
                   <a:srgbClr val="006FC0"/>
                 </a:solidFill>
@@ -12841,7 +12952,7 @@
               <a:t>data</a:t>
             </a:r>
             <a:r>
-              <a:rPr lang="en-US" sz="1181" dirty="0">
+              <a:rPr lang="en-US" sz="2000" dirty="0">
                 <a:solidFill>
                   <a:srgbClr val="006FC0"/>
                 </a:solidFill>
@@ -12851,7 +12962,7 @@
               <a:t> and </a:t>
             </a:r>
             <a:r>
-              <a:rPr lang="en-US" sz="1181" b="1" u="sng" dirty="0">
+              <a:rPr lang="en-US" sz="2000" b="1" u="sng" dirty="0">
                 <a:solidFill>
                   <a:srgbClr val="006FC0"/>
                 </a:solidFill>
@@ -12861,7 +12972,7 @@
               <a:t>operations</a:t>
             </a:r>
             <a:r>
-              <a:rPr lang="en-US" sz="1181" dirty="0">
+              <a:rPr lang="en-US" sz="2000" dirty="0">
                 <a:solidFill>
                   <a:srgbClr val="006FC0"/>
                 </a:solidFill>
@@ -12881,7 +12992,7 @@
               </a:spcBef>
             </a:pPr>
             <a:r>
-              <a:rPr lang="en-US" sz="1181" b="1" dirty="0">
+              <a:rPr lang="en-US" sz="2000" b="1" dirty="0">
                 <a:solidFill>
                   <a:srgbClr val="006FC0"/>
                 </a:solidFill>
@@ -12890,7 +13001,7 @@
               </a:rPr>
               <a:t>Data</a:t>
             </a:r>
-            <a:endParaRPr lang="en-US" sz="1519" b="1" dirty="0">
+            <a:endParaRPr lang="en-US" sz="2800" b="1" dirty="0">
               <a:latin typeface="Calibri"/>
               <a:cs typeface="Calibri"/>
             </a:endParaRPr>
@@ -12904,7 +13015,7 @@
               <a:buChar char="•"/>
             </a:pPr>
             <a:r>
-              <a:rPr lang="en-US" sz="1181" dirty="0">
+              <a:rPr lang="en-US" sz="2000" dirty="0">
                 <a:solidFill>
                   <a:srgbClr val="006FC0"/>
                 </a:solidFill>
@@ -12921,7 +13032,7 @@
               <a:buFont typeface="Arial" panose="020B0604020202020204" pitchFamily="34" charset="0"/>
               <a:buChar char="•"/>
             </a:pPr>
-            <a:endParaRPr lang="en-US" sz="1181" spc="-2" dirty="0">
+            <a:endParaRPr lang="en-US" sz="2000" spc="-2" dirty="0">
               <a:latin typeface="Calibri"/>
               <a:cs typeface="Calibri"/>
             </a:endParaRPr>
@@ -12933,58 +13044,81 @@
               </a:tabLst>
             </a:pPr>
             <a:r>
-              <a:rPr lang="en-US" sz="1181" dirty="0" err="1">
+              <a:rPr lang="en-US" sz="2000" dirty="0">
                 <a:latin typeface="Calibri"/>
                 <a:cs typeface="Calibri"/>
               </a:rPr>
-              <a:t>int</a:t>
-            </a:r>
-            <a:r>
-              <a:rPr lang="en-US" sz="1181" dirty="0">
+              <a:t>A = 5</a:t>
+            </a:r>
+            <a:r>
+              <a:rPr sz="2000" spc="-2" dirty="0">
                 <a:latin typeface="Calibri"/>
                 <a:cs typeface="Calibri"/>
               </a:rPr>
-              <a:t> a;</a:t>
-            </a:r>
-            <a:r>
-              <a:rPr sz="1181" spc="-2" dirty="0">
+              <a:t>	</a:t>
+            </a:r>
+            <a:r>
+              <a:rPr sz="2000" spc="-2" dirty="0">
+                <a:solidFill>
+                  <a:srgbClr val="767070"/>
+                </a:solidFill>
                 <a:latin typeface="Calibri"/>
                 <a:cs typeface="Calibri"/>
               </a:rPr>
-              <a:t>	</a:t>
-            </a:r>
-            <a:r>
-              <a:rPr sz="1181" spc="-2" dirty="0">
+              <a:t>//</a:t>
+            </a:r>
+            <a:r>
+              <a:rPr lang="en-US" sz="2000" spc="-2" dirty="0">
                 <a:solidFill>
                   <a:srgbClr val="767070"/>
                 </a:solidFill>
                 <a:latin typeface="Calibri"/>
                 <a:cs typeface="Calibri"/>
               </a:rPr>
-              <a:t>//</a:t>
-            </a:r>
-            <a:r>
-              <a:rPr lang="en-US" sz="1181" spc="-2" dirty="0">
+              <a:t> a variable</a:t>
+            </a:r>
+          </a:p>
+          <a:p>
+            <a:pPr marL="5358">
+              <a:tabLst>
+                <a:tab pos="519739" algn="l"/>
+              </a:tabLst>
+            </a:pPr>
+            <a:r>
+              <a:rPr lang="en-US" sz="2000" spc="-2" dirty="0">
                 <a:solidFill>
                   <a:srgbClr val="767070"/>
                 </a:solidFill>
                 <a:latin typeface="Calibri"/>
                 <a:cs typeface="Calibri"/>
               </a:rPr>
-              <a:t> a variable</a:t>
-            </a:r>
-            <a:endParaRPr sz="1181" dirty="0">
-              <a:latin typeface="Calibri"/>
-              <a:cs typeface="Calibri"/>
-            </a:endParaRPr>
-          </a:p>
-          <a:p>
-            <a:pPr>
-              <a:spcBef>
-                <a:spcPts val="13"/>
-              </a:spcBef>
+              <a:t>B = 5.0</a:t>
+            </a:r>
+          </a:p>
+          <a:p>
+            <a:pPr marL="5358">
+              <a:tabLst>
+                <a:tab pos="519739" algn="l"/>
+              </a:tabLst>
             </a:pPr>
-            <a:endParaRPr sz="1350" dirty="0">
+            <a:r>
+              <a:rPr lang="en-US" sz="2000" spc="-2" dirty="0">
+                <a:solidFill>
+                  <a:srgbClr val="767070"/>
+                </a:solidFill>
+                <a:latin typeface="Calibri"/>
+                <a:cs typeface="Calibri"/>
+              </a:rPr>
+              <a:t>B =  “Hi”</a:t>
+            </a:r>
+          </a:p>
+          <a:p>
+            <a:pPr marL="5358">
+              <a:tabLst>
+                <a:tab pos="519739" algn="l"/>
+              </a:tabLst>
+            </a:pPr>
+            <a:endParaRPr sz="2400" dirty="0">
               <a:latin typeface="Calibri"/>
               <a:cs typeface="Calibri"/>
             </a:endParaRPr>
@@ -12999,7 +13133,7 @@
               </a:spcBef>
             </a:pPr>
             <a:r>
-              <a:rPr lang="en-US" sz="1181" b="1" dirty="0">
+              <a:rPr lang="en-US" sz="2000" b="1" dirty="0">
                 <a:solidFill>
                   <a:srgbClr val="006FC0"/>
                 </a:solidFill>
@@ -13021,7 +13155,7 @@
               <a:buChar char="•"/>
             </a:pPr>
             <a:r>
-              <a:rPr lang="en-US" sz="1181" dirty="0">
+              <a:rPr lang="en-US" sz="2000" dirty="0">
                 <a:solidFill>
                   <a:srgbClr val="006FC0"/>
                 </a:solidFill>
@@ -13043,7 +13177,7 @@
               <a:buChar char="•"/>
             </a:pPr>
             <a:r>
-              <a:rPr lang="en-US" sz="1181" dirty="0">
+              <a:rPr lang="en-US" sz="2000" dirty="0">
                 <a:solidFill>
                   <a:srgbClr val="006FC0"/>
                 </a:solidFill>
@@ -13065,7 +13199,7 @@
               <a:buChar char="•"/>
             </a:pPr>
             <a:r>
-              <a:rPr lang="en-US" sz="1181" dirty="0">
+              <a:rPr lang="en-US" sz="2000" dirty="0">
                 <a:solidFill>
                   <a:srgbClr val="006FC0"/>
                 </a:solidFill>
@@ -13074,7 +13208,7 @@
               </a:rPr>
               <a:t>return data as output</a:t>
             </a:r>
-            <a:endParaRPr lang="en-US" sz="1181" spc="-4" dirty="0">
+            <a:endParaRPr lang="en-US" sz="2000" spc="-4" dirty="0">
               <a:latin typeface="Calibri"/>
               <a:cs typeface="Calibri"/>
             </a:endParaRPr>
@@ -13089,19 +13223,19 @@
               </a:spcBef>
             </a:pPr>
             <a:r>
-              <a:rPr lang="en-US" sz="1181" spc="-6" dirty="0">
+              <a:rPr lang="en-US" sz="2000" spc="-6" dirty="0">
                 <a:cs typeface="Calibri"/>
               </a:rPr>
               <a:t>add(a, 6)</a:t>
             </a:r>
             <a:r>
-              <a:rPr lang="en-US" sz="1181" dirty="0">
+              <a:rPr lang="en-US" sz="2000" dirty="0">
                 <a:cs typeface="Calibri"/>
               </a:rPr>
-              <a:t>; 		</a:t>
-            </a:r>
-            <a:r>
-              <a:rPr lang="en-US" sz="1181" spc="-2" dirty="0">
+              <a:t>		</a:t>
+            </a:r>
+            <a:r>
+              <a:rPr lang="en-US" sz="2000" spc="-2" dirty="0">
                 <a:solidFill>
                   <a:srgbClr val="767070"/>
                 </a:solidFill>
@@ -13110,7 +13244,7 @@
               <a:t>// </a:t>
             </a:r>
             <a:r>
-              <a:rPr lang="en-US" sz="1181" dirty="0">
+              <a:rPr lang="en-US" sz="2000" dirty="0">
                 <a:solidFill>
                   <a:srgbClr val="767070"/>
                 </a:solidFill>
@@ -13128,7 +13262,26 @@
                 <a:spcPts val="2"/>
               </a:spcBef>
             </a:pPr>
-            <a:endParaRPr lang="en-US" sz="1181" dirty="0">
+            <a:r>
+              <a:rPr lang="en-US" sz="2000" dirty="0">
+                <a:solidFill>
+                  <a:srgbClr val="767070"/>
+                </a:solidFill>
+                <a:cs typeface="Calibri"/>
+              </a:rPr>
+              <a:t>5 + 6</a:t>
+            </a:r>
+          </a:p>
+          <a:p>
+            <a:pPr marL="5358" marR="239241">
+              <a:lnSpc>
+                <a:spcPct val="119300"/>
+              </a:lnSpc>
+              <a:spcBef>
+                <a:spcPts val="2"/>
+              </a:spcBef>
+            </a:pPr>
+            <a:endParaRPr lang="en-US" sz="2000" dirty="0">
               <a:solidFill>
                 <a:srgbClr val="767070"/>
               </a:solidFill>
@@ -13243,7 +13396,7 @@
         <p:spPr>
           <a:xfrm>
             <a:off x="593606" y="870023"/>
-            <a:ext cx="4765794" cy="2752124"/>
+            <a:ext cx="4765794" cy="3518103"/>
           </a:xfrm>
           <a:prstGeom prst="rect">
             <a:avLst/>
@@ -13264,7 +13417,7 @@
               </a:spcBef>
             </a:pPr>
             <a:r>
-              <a:rPr lang="en-US" sz="1519" dirty="0">
+              <a:rPr lang="en-US" dirty="0">
                 <a:latin typeface="Calibri"/>
                 <a:cs typeface="Calibri"/>
               </a:rPr>
@@ -13281,7 +13434,7 @@
               </a:spcBef>
             </a:pPr>
             <a:r>
-              <a:rPr lang="en-US" sz="1181" dirty="0">
+              <a:rPr lang="en-US" sz="1400" dirty="0">
                 <a:solidFill>
                   <a:srgbClr val="006FC0"/>
                 </a:solidFill>
@@ -13291,7 +13444,7 @@
               <a:t>There are </a:t>
             </a:r>
             <a:r>
-              <a:rPr lang="en-US" sz="1181" b="1" u="sng" dirty="0">
+              <a:rPr lang="en-US" sz="1400" b="1" u="sng" dirty="0">
                 <a:solidFill>
                   <a:srgbClr val="006FC0"/>
                 </a:solidFill>
@@ -13301,7 +13454,7 @@
               <a:t>data</a:t>
             </a:r>
             <a:r>
-              <a:rPr lang="en-US" sz="1181" dirty="0">
+              <a:rPr lang="en-US" sz="1400" dirty="0">
                 <a:solidFill>
                   <a:srgbClr val="006FC0"/>
                 </a:solidFill>
@@ -13311,7 +13464,7 @@
               <a:t> and </a:t>
             </a:r>
             <a:r>
-              <a:rPr lang="en-US" sz="1181" b="1" u="sng" dirty="0">
+              <a:rPr lang="en-US" sz="1400" b="1" u="sng" dirty="0">
                 <a:solidFill>
                   <a:srgbClr val="006FC0"/>
                 </a:solidFill>
@@ -13321,7 +13474,7 @@
               <a:t>operations</a:t>
             </a:r>
             <a:r>
-              <a:rPr lang="en-US" sz="1181" dirty="0">
+              <a:rPr lang="en-US" sz="1400" dirty="0">
                 <a:solidFill>
                   <a:srgbClr val="006FC0"/>
                 </a:solidFill>
@@ -13341,7 +13494,7 @@
               </a:spcBef>
             </a:pPr>
             <a:r>
-              <a:rPr lang="en-US" sz="1181" b="1" dirty="0">
+              <a:rPr lang="en-US" sz="1400" b="1" dirty="0">
                 <a:solidFill>
                   <a:srgbClr val="006FC0"/>
                 </a:solidFill>
@@ -13350,7 +13503,7 @@
               </a:rPr>
               <a:t>Data</a:t>
             </a:r>
-            <a:endParaRPr lang="en-US" sz="1519" b="1" dirty="0">
+            <a:endParaRPr lang="en-US" b="1" dirty="0">
               <a:latin typeface="Calibri"/>
               <a:cs typeface="Calibri"/>
             </a:endParaRPr>
@@ -13364,7 +13517,7 @@
               <a:buChar char="•"/>
             </a:pPr>
             <a:r>
-              <a:rPr lang="en-US" sz="1181" dirty="0">
+              <a:rPr lang="en-US" sz="1400" dirty="0">
                 <a:solidFill>
                   <a:srgbClr val="006FC0"/>
                 </a:solidFill>
@@ -13381,7 +13534,7 @@
               <a:buFont typeface="Arial" panose="020B0604020202020204" pitchFamily="34" charset="0"/>
               <a:buChar char="•"/>
             </a:pPr>
-            <a:endParaRPr lang="en-US" sz="1181" spc="-2" dirty="0">
+            <a:endParaRPr lang="en-US" sz="1400" spc="-2" dirty="0">
               <a:latin typeface="Calibri"/>
               <a:cs typeface="Calibri"/>
             </a:endParaRPr>
@@ -13393,28 +13546,28 @@
               </a:tabLst>
             </a:pPr>
             <a:r>
-              <a:rPr lang="en-US" sz="1181" dirty="0" err="1">
+              <a:rPr lang="en-US" sz="1400" dirty="0" err="1">
                 <a:latin typeface="Calibri"/>
                 <a:cs typeface="Calibri"/>
               </a:rPr>
               <a:t>int</a:t>
             </a:r>
             <a:r>
-              <a:rPr lang="en-US" sz="1181" dirty="0">
+              <a:rPr lang="en-US" sz="1400" dirty="0">
                 <a:latin typeface="Calibri"/>
                 <a:cs typeface="Calibri"/>
               </a:rPr>
               <a:t> a;</a:t>
             </a:r>
             <a:r>
-              <a:rPr sz="1181" spc="-2" dirty="0">
+              <a:rPr sz="1400" spc="-2" dirty="0">
                 <a:latin typeface="Calibri"/>
                 <a:cs typeface="Calibri"/>
               </a:rPr>
               <a:t>	</a:t>
             </a:r>
             <a:r>
-              <a:rPr sz="1181" spc="-2" dirty="0">
+              <a:rPr sz="1400" spc="-2" dirty="0">
                 <a:solidFill>
                   <a:srgbClr val="767070"/>
                 </a:solidFill>
@@ -13424,7 +13577,7 @@
               <a:t>//</a:t>
             </a:r>
             <a:r>
-              <a:rPr lang="en-US" sz="1181" spc="-2" dirty="0">
+              <a:rPr lang="en-US" sz="1400" spc="-2" dirty="0">
                 <a:solidFill>
                   <a:srgbClr val="767070"/>
                 </a:solidFill>
@@ -13433,7 +13586,7 @@
               </a:rPr>
               <a:t> a variable</a:t>
             </a:r>
-            <a:endParaRPr sz="1181" dirty="0">
+            <a:endParaRPr sz="1400" dirty="0">
               <a:latin typeface="Calibri"/>
               <a:cs typeface="Calibri"/>
             </a:endParaRPr>
@@ -13444,7 +13597,7 @@
                 <a:spcPts val="13"/>
               </a:spcBef>
             </a:pPr>
-            <a:endParaRPr sz="1350" dirty="0">
+            <a:endParaRPr sz="1600" dirty="0">
               <a:latin typeface="Calibri"/>
               <a:cs typeface="Calibri"/>
             </a:endParaRPr>
@@ -13459,7 +13612,7 @@
               </a:spcBef>
             </a:pPr>
             <a:r>
-              <a:rPr lang="en-US" sz="1181" b="1" dirty="0">
+              <a:rPr lang="en-US" sz="1400" b="1" dirty="0">
                 <a:solidFill>
                   <a:srgbClr val="006FC0"/>
                 </a:solidFill>
@@ -13481,7 +13634,7 @@
               <a:buChar char="•"/>
             </a:pPr>
             <a:r>
-              <a:rPr lang="en-US" sz="1181" dirty="0">
+              <a:rPr lang="en-US" sz="1400" dirty="0">
                 <a:solidFill>
                   <a:srgbClr val="006FC0"/>
                 </a:solidFill>
@@ -13503,7 +13656,7 @@
               <a:buChar char="•"/>
             </a:pPr>
             <a:r>
-              <a:rPr lang="en-US" sz="1181" dirty="0">
+              <a:rPr lang="en-US" sz="1400" dirty="0">
                 <a:solidFill>
                   <a:srgbClr val="006FC0"/>
                 </a:solidFill>
@@ -13525,7 +13678,7 @@
               <a:buChar char="•"/>
             </a:pPr>
             <a:r>
-              <a:rPr lang="en-US" sz="1181" dirty="0">
+              <a:rPr lang="en-US" sz="1400" dirty="0">
                 <a:solidFill>
                   <a:srgbClr val="006FC0"/>
                 </a:solidFill>
@@ -13534,7 +13687,7 @@
               </a:rPr>
               <a:t>return data as output</a:t>
             </a:r>
-            <a:endParaRPr lang="en-US" sz="1181" spc="-4" dirty="0">
+            <a:endParaRPr lang="en-US" sz="1400" spc="-4" dirty="0">
               <a:latin typeface="Calibri"/>
               <a:cs typeface="Calibri"/>
             </a:endParaRPr>
@@ -13549,19 +13702,19 @@
               </a:spcBef>
             </a:pPr>
             <a:r>
-              <a:rPr lang="en-US" sz="1181" spc="-6" dirty="0">
+              <a:rPr lang="en-US" sz="1400" spc="-6" dirty="0">
                 <a:cs typeface="Calibri"/>
               </a:rPr>
               <a:t>add(a, 6)</a:t>
             </a:r>
             <a:r>
-              <a:rPr lang="en-US" sz="1181" dirty="0">
+              <a:rPr lang="en-US" sz="1400" dirty="0">
                 <a:cs typeface="Calibri"/>
               </a:rPr>
               <a:t>; 		</a:t>
             </a:r>
             <a:r>
-              <a:rPr lang="en-US" sz="1181" spc="-2" dirty="0">
+              <a:rPr lang="en-US" sz="1400" spc="-2" dirty="0">
                 <a:solidFill>
                   <a:srgbClr val="767070"/>
                 </a:solidFill>
@@ -13570,7 +13723,7 @@
               <a:t>// </a:t>
             </a:r>
             <a:r>
-              <a:rPr lang="en-US" sz="1181" dirty="0">
+              <a:rPr lang="en-US" sz="1400" dirty="0">
                 <a:solidFill>
                   <a:srgbClr val="767070"/>
                 </a:solidFill>
@@ -13588,7 +13741,7 @@
                 <a:spcPts val="2"/>
               </a:spcBef>
             </a:pPr>
-            <a:endParaRPr lang="en-US" sz="1181" dirty="0">
+            <a:endParaRPr lang="en-US" sz="1400" dirty="0">
               <a:solidFill>
                 <a:srgbClr val="767070"/>
               </a:solidFill>
@@ -13612,7 +13765,7 @@
         <p:spPr>
           <a:xfrm>
             <a:off x="6505456" y="908196"/>
-            <a:ext cx="4210169" cy="3390696"/>
+            <a:ext cx="4210169" cy="3983615"/>
           </a:xfrm>
           <a:prstGeom prst="rect">
             <a:avLst/>
@@ -13632,7 +13785,7 @@
                 <a:spcPts val="2"/>
               </a:spcBef>
             </a:pPr>
-            <a:endParaRPr lang="en-US" sz="1181" dirty="0">
+            <a:endParaRPr lang="en-US" sz="1400" dirty="0">
               <a:solidFill>
                 <a:srgbClr val="767070"/>
               </a:solidFill>
@@ -13649,14 +13802,14 @@
               </a:spcBef>
             </a:pPr>
             <a:r>
-              <a:rPr lang="en-US" sz="1350" dirty="0">
+              <a:rPr lang="en-US" sz="1600" dirty="0">
                 <a:latin typeface="Calibri"/>
                 <a:cs typeface="Calibri"/>
               </a:rPr>
               <a:t>Versus</a:t>
             </a:r>
             <a:r>
-              <a:rPr lang="en-US" sz="1350" b="1" dirty="0">
+              <a:rPr lang="en-US" sz="1600" b="1" dirty="0">
                 <a:latin typeface="Calibri"/>
                 <a:cs typeface="Calibri"/>
               </a:rPr>
@@ -13673,7 +13826,7 @@
               </a:spcBef>
             </a:pPr>
             <a:r>
-              <a:rPr lang="en-US" sz="1350" dirty="0">
+              <a:rPr lang="en-US" sz="1600" dirty="0">
                 <a:latin typeface="Calibri"/>
                 <a:cs typeface="Calibri"/>
               </a:rPr>
@@ -13690,7 +13843,7 @@
               </a:spcBef>
             </a:pPr>
             <a:r>
-              <a:rPr lang="en-US" sz="1350" dirty="0">
+              <a:rPr lang="en-US" sz="1600" dirty="0">
                 <a:latin typeface="Calibri"/>
                 <a:cs typeface="Calibri"/>
               </a:rPr>
@@ -13707,21 +13860,21 @@
               </a:spcBef>
             </a:pPr>
             <a:r>
-              <a:rPr lang="en-US" sz="1350" dirty="0">
+              <a:rPr lang="en-US" sz="1600" dirty="0">
                 <a:latin typeface="Calibri"/>
                 <a:cs typeface="Calibri"/>
               </a:rPr>
               <a:t>Car </a:t>
             </a:r>
             <a:r>
-              <a:rPr lang="en-US" sz="1350" dirty="0" err="1">
+              <a:rPr lang="en-US" sz="1600" dirty="0" err="1">
                 <a:latin typeface="Calibri"/>
                 <a:cs typeface="Calibri"/>
               </a:rPr>
               <a:t>sallysCar</a:t>
             </a:r>
             <a:r>
-              <a:rPr lang="en-US" sz="1350" dirty="0">
+              <a:rPr lang="en-US" sz="1600" dirty="0">
                 <a:latin typeface="Calibri"/>
                 <a:cs typeface="Calibri"/>
               </a:rPr>
@@ -13737,7 +13890,7 @@
                 <a:spcPts val="2"/>
               </a:spcBef>
             </a:pPr>
-            <a:endParaRPr lang="en-US" sz="1350" dirty="0">
+            <a:endParaRPr lang="en-US" sz="1600" dirty="0">
               <a:latin typeface="Calibri"/>
               <a:cs typeface="Calibri"/>
             </a:endParaRPr>
@@ -13752,28 +13905,28 @@
               </a:spcBef>
             </a:pPr>
             <a:r>
-              <a:rPr lang="en-US" sz="1350" dirty="0" err="1">
+              <a:rPr lang="en-US" sz="1600" dirty="0" err="1">
                 <a:latin typeface="Calibri"/>
                 <a:cs typeface="Calibri"/>
               </a:rPr>
               <a:t>Sally.drive</a:t>
             </a:r>
             <a:r>
-              <a:rPr lang="en-US" sz="1350" dirty="0">
+              <a:rPr lang="en-US" sz="1600" dirty="0">
                 <a:latin typeface="Calibri"/>
                 <a:cs typeface="Calibri"/>
               </a:rPr>
               <a:t>() -&gt; </a:t>
             </a:r>
             <a:r>
-              <a:rPr lang="en-US" sz="1350" dirty="0" err="1">
+              <a:rPr lang="en-US" sz="1600" dirty="0" err="1">
                 <a:latin typeface="Calibri"/>
                 <a:cs typeface="Calibri"/>
               </a:rPr>
               <a:t>sallysCar.drive</a:t>
             </a:r>
             <a:r>
-              <a:rPr lang="en-US" sz="1350" dirty="0">
+              <a:rPr lang="en-US" sz="1600" dirty="0">
                 <a:latin typeface="Calibri"/>
                 <a:cs typeface="Calibri"/>
               </a:rPr>
@@ -13789,7 +13942,7 @@
                 <a:spcPts val="2"/>
               </a:spcBef>
             </a:pPr>
-            <a:endParaRPr lang="en-US" sz="1350" dirty="0">
+            <a:endParaRPr lang="en-US" sz="1600" dirty="0">
               <a:latin typeface="Calibri"/>
               <a:cs typeface="Calibri"/>
             </a:endParaRPr>
@@ -13804,7 +13957,7 @@
               </a:spcBef>
             </a:pPr>
             <a:r>
-              <a:rPr lang="en-US" sz="1350" dirty="0">
+              <a:rPr lang="en-US" sz="1600" dirty="0">
                 <a:latin typeface="Calibri"/>
                 <a:cs typeface="Calibri"/>
               </a:rPr>
@@ -13821,28 +13974,28 @@
               </a:spcBef>
             </a:pPr>
             <a:r>
-              <a:rPr lang="en-US" sz="1350" dirty="0" err="1">
+              <a:rPr lang="en-US" sz="1600" dirty="0" err="1">
                 <a:latin typeface="Calibri"/>
                 <a:cs typeface="Calibri"/>
               </a:rPr>
               <a:t>BuildingElement</a:t>
             </a:r>
             <a:r>
-              <a:rPr lang="en-US" sz="1350" dirty="0">
+              <a:rPr lang="en-US" sz="1600" dirty="0">
                 <a:latin typeface="Calibri"/>
                 <a:cs typeface="Calibri"/>
               </a:rPr>
               <a:t> </a:t>
             </a:r>
             <a:r>
-              <a:rPr lang="en-US" sz="1350" dirty="0" err="1">
+              <a:rPr lang="en-US" sz="1600" dirty="0" err="1">
                 <a:latin typeface="Calibri"/>
                 <a:cs typeface="Calibri"/>
               </a:rPr>
               <a:t>myElement</a:t>
             </a:r>
             <a:r>
-              <a:rPr lang="en-US" sz="1350" dirty="0">
+              <a:rPr lang="en-US" sz="1600" dirty="0">
                 <a:latin typeface="Calibri"/>
                 <a:cs typeface="Calibri"/>
               </a:rPr>
@@ -13859,14 +14012,14 @@
               </a:spcBef>
             </a:pPr>
             <a:r>
-              <a:rPr lang="en-US" sz="1350" dirty="0" err="1">
+              <a:rPr lang="en-US" sz="1600" dirty="0" err="1">
                 <a:latin typeface="Calibri"/>
                 <a:cs typeface="Calibri"/>
               </a:rPr>
               <a:t>myElement.draw</a:t>
             </a:r>
             <a:r>
-              <a:rPr lang="en-US" sz="1350" dirty="0">
+              <a:rPr lang="en-US" sz="1600" dirty="0">
                 <a:latin typeface="Calibri"/>
                 <a:cs typeface="Calibri"/>
               </a:rPr>
@@ -13883,20 +14036,20 @@
               </a:spcBef>
             </a:pPr>
             <a:r>
-              <a:rPr lang="en-US" sz="1350" dirty="0" err="1">
+              <a:rPr lang="en-US" sz="1600" dirty="0" err="1">
                 <a:latin typeface="Calibri"/>
                 <a:cs typeface="Calibri"/>
               </a:rPr>
               <a:t>myElement.delete</a:t>
             </a:r>
             <a:r>
-              <a:rPr lang="en-US" sz="1350" dirty="0">
+              <a:rPr lang="en-US" sz="1600" dirty="0">
                 <a:latin typeface="Calibri"/>
                 <a:cs typeface="Calibri"/>
               </a:rPr>
               <a:t>();</a:t>
             </a:r>
-            <a:endParaRPr lang="en-US" sz="1688" dirty="0">
+            <a:endParaRPr lang="en-US" sz="2000" dirty="0">
               <a:latin typeface="Calibri"/>
               <a:cs typeface="Calibri"/>
             </a:endParaRPr>
@@ -13910,7 +14063,7 @@
                 <a:spcPts val="2"/>
               </a:spcBef>
             </a:pPr>
-            <a:endParaRPr lang="en-US" sz="1181" dirty="0">
+            <a:endParaRPr lang="en-US" sz="1400" dirty="0">
               <a:solidFill>
                 <a:srgbClr val="767070"/>
               </a:solidFill>

</xml_diff>